<commit_message>
added a lot of stuff
</commit_message>
<xml_diff>
--- a/AP_Explore_Practice/For Submission/Neuralink_Presentation.pptx
+++ b/AP_Explore_Practice/For Submission/Neuralink_Presentation.pptx
@@ -110,6 +110,11 @@
       </a:defRPr>
     </a:lvl9pPr>
   </p:defaultTextStyle>
+  <p:extLst>
+    <p:ext uri="{EFAFB233-063F-42B5-8137-9DF3F51BA10A}">
+      <p15:sldGuideLst xmlns:p15="http://schemas.microsoft.com/office/powerpoint/2012/main"/>
+    </p:ext>
+  </p:extLst>
 </p:presentation>
 </file>
 
@@ -482,7 +487,7 @@
               <a:rPr lang="en-US" smtClean="0"/>
               <a:t>12/19/2019</a:t>
             </a:fld>
-            <a:endParaRPr lang="en-US"/>
+            <a:endParaRPr lang="en-US" dirty="0"/>
           </a:p>
         </p:txBody>
       </p:sp>
@@ -514,7 +519,7 @@
             </a:lvl1pPr>
           </a:lstStyle>
           <a:p>
-            <a:endParaRPr lang="en-US"/>
+            <a:endParaRPr lang="en-US" dirty="0"/>
           </a:p>
         </p:txBody>
       </p:sp>
@@ -550,7 +555,7 @@
               <a:rPr lang="en-US" smtClean="0"/>
               <a:t>‹#›</a:t>
             </a:fld>
-            <a:endParaRPr lang="en-US"/>
+            <a:endParaRPr lang="en-US" dirty="0"/>
           </a:p>
         </p:txBody>
       </p:sp>
@@ -729,7 +734,7 @@
               <a:rPr lang="en-US" smtClean="0"/>
               <a:t>12/19/2019</a:t>
             </a:fld>
-            <a:endParaRPr lang="en-US"/>
+            <a:endParaRPr lang="en-US" dirty="0"/>
           </a:p>
         </p:txBody>
       </p:sp>
@@ -748,7 +753,7 @@
           <a:bodyPr/>
           <a:lstStyle/>
           <a:p>
-            <a:endParaRPr lang="en-US"/>
+            <a:endParaRPr lang="en-US" dirty="0"/>
           </a:p>
         </p:txBody>
       </p:sp>
@@ -771,7 +776,7 @@
               <a:rPr lang="en-US" smtClean="0"/>
               <a:t>‹#›</a:t>
             </a:fld>
-            <a:endParaRPr lang="en-US"/>
+            <a:endParaRPr lang="en-US" dirty="0"/>
           </a:p>
         </p:txBody>
       </p:sp>
@@ -1115,7 +1120,7 @@
               <a:rPr lang="en-US" smtClean="0"/>
               <a:t>12/19/2019</a:t>
             </a:fld>
-            <a:endParaRPr lang="en-US"/>
+            <a:endParaRPr lang="en-US" dirty="0"/>
           </a:p>
         </p:txBody>
       </p:sp>
@@ -1139,7 +1144,7 @@
           <a:bodyPr/>
           <a:lstStyle/>
           <a:p>
-            <a:endParaRPr lang="en-US"/>
+            <a:endParaRPr lang="en-US" dirty="0"/>
           </a:p>
         </p:txBody>
       </p:sp>
@@ -1167,7 +1172,7 @@
               <a:rPr lang="en-US" smtClean="0"/>
               <a:t>‹#›</a:t>
             </a:fld>
-            <a:endParaRPr lang="en-US"/>
+            <a:endParaRPr lang="en-US" dirty="0"/>
           </a:p>
         </p:txBody>
       </p:sp>
@@ -1344,7 +1349,7 @@
               <a:rPr lang="en-US" smtClean="0"/>
               <a:t>12/19/2019</a:t>
             </a:fld>
-            <a:endParaRPr lang="en-US"/>
+            <a:endParaRPr lang="en-US" dirty="0"/>
           </a:p>
         </p:txBody>
       </p:sp>
@@ -1363,7 +1368,7 @@
           <a:bodyPr/>
           <a:lstStyle/>
           <a:p>
-            <a:endParaRPr lang="en-US"/>
+            <a:endParaRPr lang="en-US" dirty="0"/>
           </a:p>
         </p:txBody>
       </p:sp>
@@ -1386,7 +1391,7 @@
               <a:rPr lang="en-US" smtClean="0"/>
               <a:t>‹#›</a:t>
             </a:fld>
-            <a:endParaRPr lang="en-US"/>
+            <a:endParaRPr lang="en-US" dirty="0"/>
           </a:p>
         </p:txBody>
       </p:sp>
@@ -1835,7 +1840,7 @@
               <a:rPr lang="en-US" smtClean="0"/>
               <a:t>12/19/2019</a:t>
             </a:fld>
-            <a:endParaRPr lang="en-US"/>
+            <a:endParaRPr lang="en-US" dirty="0"/>
           </a:p>
         </p:txBody>
       </p:sp>
@@ -1870,7 +1875,7 @@
             </a:lvl1pPr>
           </a:lstStyle>
           <a:p>
-            <a:endParaRPr lang="en-US"/>
+            <a:endParaRPr lang="en-US" dirty="0"/>
           </a:p>
         </p:txBody>
       </p:sp>
@@ -1906,7 +1911,7 @@
               <a:rPr lang="en-US" smtClean="0"/>
               <a:t>‹#›</a:t>
             </a:fld>
-            <a:endParaRPr lang="en-US"/>
+            <a:endParaRPr lang="en-US" dirty="0"/>
           </a:p>
         </p:txBody>
       </p:sp>
@@ -2145,7 +2150,7 @@
               <a:rPr lang="en-US" smtClean="0"/>
               <a:t>12/19/2019</a:t>
             </a:fld>
-            <a:endParaRPr lang="en-US"/>
+            <a:endParaRPr lang="en-US" dirty="0"/>
           </a:p>
         </p:txBody>
       </p:sp>
@@ -2164,7 +2169,7 @@
           <a:bodyPr/>
           <a:lstStyle/>
           <a:p>
-            <a:endParaRPr lang="en-US"/>
+            <a:endParaRPr lang="en-US" dirty="0"/>
           </a:p>
         </p:txBody>
       </p:sp>
@@ -2187,7 +2192,7 @@
               <a:rPr lang="en-US" smtClean="0"/>
               <a:t>‹#›</a:t>
             </a:fld>
-            <a:endParaRPr lang="en-US"/>
+            <a:endParaRPr lang="en-US" dirty="0"/>
           </a:p>
         </p:txBody>
       </p:sp>
@@ -2536,7 +2541,7 @@
               <a:rPr lang="en-US" smtClean="0"/>
               <a:t>12/19/2019</a:t>
             </a:fld>
-            <a:endParaRPr lang="en-US"/>
+            <a:endParaRPr lang="en-US" dirty="0"/>
           </a:p>
         </p:txBody>
       </p:sp>
@@ -2555,7 +2560,7 @@
           <a:bodyPr/>
           <a:lstStyle/>
           <a:p>
-            <a:endParaRPr lang="en-US"/>
+            <a:endParaRPr lang="en-US" dirty="0"/>
           </a:p>
         </p:txBody>
       </p:sp>
@@ -2578,7 +2583,7 @@
               <a:rPr lang="en-US" smtClean="0"/>
               <a:t>‹#›</a:t>
             </a:fld>
-            <a:endParaRPr lang="en-US"/>
+            <a:endParaRPr lang="en-US" dirty="0"/>
           </a:p>
         </p:txBody>
       </p:sp>
@@ -2654,7 +2659,7 @@
               <a:rPr lang="en-US" smtClean="0"/>
               <a:t>12/19/2019</a:t>
             </a:fld>
-            <a:endParaRPr lang="en-US"/>
+            <a:endParaRPr lang="en-US" dirty="0"/>
           </a:p>
         </p:txBody>
       </p:sp>
@@ -2673,7 +2678,7 @@
           <a:bodyPr/>
           <a:lstStyle/>
           <a:p>
-            <a:endParaRPr lang="en-US"/>
+            <a:endParaRPr lang="en-US" dirty="0"/>
           </a:p>
         </p:txBody>
       </p:sp>
@@ -2696,7 +2701,7 @@
               <a:rPr lang="en-US" smtClean="0"/>
               <a:t>‹#›</a:t>
             </a:fld>
-            <a:endParaRPr lang="en-US"/>
+            <a:endParaRPr lang="en-US" dirty="0"/>
           </a:p>
         </p:txBody>
       </p:sp>
@@ -2749,7 +2754,7 @@
               <a:rPr lang="en-US" smtClean="0"/>
               <a:t>12/19/2019</a:t>
             </a:fld>
-            <a:endParaRPr lang="en-US"/>
+            <a:endParaRPr lang="en-US" dirty="0"/>
           </a:p>
         </p:txBody>
       </p:sp>
@@ -2768,7 +2773,7 @@
           <a:bodyPr/>
           <a:lstStyle/>
           <a:p>
-            <a:endParaRPr lang="en-US"/>
+            <a:endParaRPr lang="en-US" dirty="0"/>
           </a:p>
         </p:txBody>
       </p:sp>
@@ -2791,7 +2796,7 @@
               <a:rPr lang="en-US" smtClean="0"/>
               <a:t>‹#›</a:t>
             </a:fld>
-            <a:endParaRPr lang="en-US"/>
+            <a:endParaRPr lang="en-US" dirty="0"/>
           </a:p>
         </p:txBody>
       </p:sp>
@@ -3049,7 +3054,7 @@
               <a:rPr lang="en-US" smtClean="0"/>
               <a:t>12/19/2019</a:t>
             </a:fld>
-            <a:endParaRPr lang="en-US"/>
+            <a:endParaRPr lang="en-US" dirty="0"/>
           </a:p>
         </p:txBody>
       </p:sp>
@@ -3068,7 +3073,7 @@
           <a:bodyPr/>
           <a:lstStyle/>
           <a:p>
-            <a:endParaRPr lang="en-US"/>
+            <a:endParaRPr lang="en-US" dirty="0"/>
           </a:p>
         </p:txBody>
       </p:sp>
@@ -3091,7 +3096,7 @@
               <a:rPr lang="en-US" smtClean="0"/>
               <a:t>‹#›</a:t>
             </a:fld>
-            <a:endParaRPr lang="en-US"/>
+            <a:endParaRPr lang="en-US" dirty="0"/>
           </a:p>
         </p:txBody>
       </p:sp>
@@ -3220,7 +3225,7 @@
           </a:lstStyle>
           <a:p>
             <a:r>
-              <a:rPr lang="en-US" smtClean="0"/>
+              <a:rPr lang="en-US" dirty="0" smtClean="0"/>
               <a:t>Click icon to add picture</a:t>
             </a:r>
             <a:endParaRPr lang="en-US" dirty="0"/>
@@ -3314,7 +3319,7 @@
               <a:rPr lang="en-US" smtClean="0"/>
               <a:t>12/19/2019</a:t>
             </a:fld>
-            <a:endParaRPr lang="en-US"/>
+            <a:endParaRPr lang="en-US" dirty="0"/>
           </a:p>
         </p:txBody>
       </p:sp>
@@ -3333,7 +3338,7 @@
           <a:bodyPr/>
           <a:lstStyle/>
           <a:p>
-            <a:endParaRPr lang="en-US"/>
+            <a:endParaRPr lang="en-US" dirty="0"/>
           </a:p>
         </p:txBody>
       </p:sp>
@@ -3356,7 +3361,7 @@
               <a:rPr lang="en-US" smtClean="0"/>
               <a:t>‹#›</a:t>
             </a:fld>
-            <a:endParaRPr lang="en-US"/>
+            <a:endParaRPr lang="en-US" dirty="0"/>
           </a:p>
         </p:txBody>
       </p:sp>
@@ -3732,7 +3737,7 @@
               <a:rPr lang="en-US" smtClean="0"/>
               <a:t>12/19/2019</a:t>
             </a:fld>
-            <a:endParaRPr lang="en-US"/>
+            <a:endParaRPr lang="en-US" dirty="0"/>
           </a:p>
         </p:txBody>
       </p:sp>
@@ -3771,7 +3776,7 @@
             </a:lvl1pPr>
           </a:lstStyle>
           <a:p>
-            <a:endParaRPr lang="en-US"/>
+            <a:endParaRPr lang="en-US" dirty="0"/>
           </a:p>
         </p:txBody>
       </p:sp>
@@ -3811,7 +3816,7 @@
               <a:rPr lang="en-US" smtClean="0"/>
               <a:t>‹#›</a:t>
             </a:fld>
-            <a:endParaRPr lang="en-US"/>
+            <a:endParaRPr lang="en-US" dirty="0"/>
           </a:p>
         </p:txBody>
       </p:sp>
@@ -4243,7 +4248,7 @@
           </p:cNvPicPr>
           <p:nvPr/>
         </p:nvPicPr>
-        <p:blipFill>
+        <p:blipFill rotWithShape="1">
           <a:blip r:embed="rId2">
             <a:extLst>
               <a:ext uri="{28A0092B-C50C-407E-A947-70E740481C1C}">
@@ -4251,15 +4256,13 @@
               </a:ext>
             </a:extLst>
           </a:blip>
-          <a:srcRect/>
-          <a:stretch>
-            <a:fillRect/>
-          </a:stretch>
+          <a:srcRect l="827" r="404"/>
+          <a:stretch/>
         </p:blipFill>
         <p:spPr bwMode="auto">
           <a:xfrm>
-            <a:off x="0" y="513186"/>
-            <a:ext cx="12150842" cy="5755662"/>
+            <a:off x="0" y="481440"/>
+            <a:ext cx="12203084" cy="5852406"/>
           </a:xfrm>
           <a:prstGeom prst="rect">
             <a:avLst/>
@@ -4288,12 +4291,14 @@
         </p:nvSpPr>
         <p:spPr>
           <a:xfrm>
-            <a:off x="3771900" y="3300340"/>
-            <a:ext cx="1861340" cy="706355"/>
+            <a:off x="3821777" y="3275218"/>
+            <a:ext cx="1861340" cy="374032"/>
           </a:xfrm>
         </p:spPr>
         <p:txBody>
-          <a:bodyPr/>
+          <a:bodyPr>
+            <a:normAutofit fontScale="92500" lnSpcReduction="20000"/>
+          </a:bodyPr>
           <a:lstStyle/>
           <a:p>
             <a:r>
@@ -4349,50 +4354,6 @@
           <a:chExt cx="0" cy="0"/>
         </a:xfrm>
       </p:grpSpPr>
-      <p:sp>
-        <p:nvSpPr>
-          <p:cNvPr id="10" name="Rectangle 9"/>
-          <p:cNvSpPr/>
-          <p:nvPr/>
-        </p:nvSpPr>
-        <p:spPr>
-          <a:xfrm>
-            <a:off x="0" y="0"/>
-            <a:ext cx="12192000" cy="6857999"/>
-          </a:xfrm>
-          <a:prstGeom prst="rect">
-            <a:avLst/>
-          </a:prstGeom>
-        </p:spPr>
-        <p:style>
-          <a:lnRef idx="2">
-            <a:schemeClr val="dk1">
-              <a:shade val="50000"/>
-            </a:schemeClr>
-          </a:lnRef>
-          <a:fillRef idx="1">
-            <a:schemeClr val="dk1"/>
-          </a:fillRef>
-          <a:effectRef idx="0">
-            <a:schemeClr val="dk1"/>
-          </a:effectRef>
-          <a:fontRef idx="minor">
-            <a:schemeClr val="lt1"/>
-          </a:fontRef>
-        </p:style>
-        <p:txBody>
-          <a:bodyPr rot="0" spcFirstLastPara="0" vert="horz" wrap="square" lIns="91440" tIns="45720" rIns="91440" bIns="45720" numCol="1" spcCol="0" rtlCol="0" fromWordArt="0" anchor="ctr" anchorCtr="0" forceAA="0" compatLnSpc="1">
-            <a:prstTxWarp prst="textNoShape">
-              <a:avLst/>
-            </a:prstTxWarp>
-            <a:noAutofit/>
-          </a:bodyPr>
-          <a:lstStyle/>
-          <a:p>
-            <a:endParaRPr lang="en-US"/>
-          </a:p>
-        </p:txBody>
-      </p:sp>
       <p:grpSp>
         <p:nvGrpSpPr>
           <p:cNvPr id="12" name="Group 11"/>
@@ -4401,8 +4362,8 @@
         </p:nvGrpSpPr>
         <p:grpSpPr>
           <a:xfrm>
-            <a:off x="5743411" y="3693367"/>
-            <a:ext cx="5253557" cy="3164632"/>
+            <a:off x="5743412" y="3693367"/>
+            <a:ext cx="5246014" cy="3164632"/>
             <a:chOff x="0" y="0"/>
             <a:chExt cx="5598465" cy="3372510"/>
           </a:xfrm>
@@ -4493,7 +4454,7 @@
                       </a:spcAft>
                     </a:pPr>
                     <a:r>
-                      <a:rPr lang="en-US" sz="1100">
+                      <a:rPr lang="en-US" sz="1100" dirty="0">
                         <a:effectLst/>
                         <a:latin typeface="Calibri" panose="020F0502020204030204" pitchFamily="34" charset="0"/>
                         <a:ea typeface="Calibri" panose="020F0502020204030204" pitchFamily="34" charset="0"/>
@@ -4580,7 +4541,7 @@
                       </a:spcAft>
                     </a:pPr>
                     <a:r>
-                      <a:rPr lang="en-US" sz="1100">
+                      <a:rPr lang="en-US" sz="1100" dirty="0">
                         <a:effectLst/>
                         <a:latin typeface="Calibri" panose="020F0502020204030204" pitchFamily="34" charset="0"/>
                         <a:ea typeface="Calibri" panose="020F0502020204030204" pitchFamily="34" charset="0"/>
@@ -4634,7 +4595,7 @@
                     </a:spcAft>
                   </a:pPr>
                   <a:r>
-                    <a:rPr lang="en-US" sz="1100">
+                    <a:rPr lang="en-US" sz="1100" dirty="0">
                       <a:effectLst/>
                       <a:latin typeface="Calibri" panose="020F0502020204030204" pitchFamily="34" charset="0"/>
                       <a:ea typeface="Calibri" panose="020F0502020204030204" pitchFamily="34" charset="0"/>
@@ -4654,8 +4615,8 @@
             </p:nvSpPr>
             <p:spPr>
               <a:xfrm>
-                <a:off x="95535" y="95534"/>
-                <a:ext cx="1698304" cy="3072438"/>
+                <a:off x="95534" y="95534"/>
+                <a:ext cx="1728192" cy="3072438"/>
               </a:xfrm>
               <a:prstGeom prst="rect">
                 <a:avLst/>
@@ -5035,7 +4996,7 @@
               </a:bodyPr>
               <a:lstStyle/>
               <a:p>
-                <a:endParaRPr lang="en-US"/>
+                <a:endParaRPr lang="en-US" dirty="0"/>
               </a:p>
             </p:txBody>
           </p:sp>
@@ -5319,9 +5280,7 @@
             <a:avLst/>
           </a:prstGeom>
           <a:solidFill>
-            <a:srgbClr val="0D0D0D">
-              <a:alpha val="50195"/>
-            </a:srgbClr>
+            <a:srgbClr val="0D0D0D"/>
           </a:solidFill>
           <a:ln w="9525">
             <a:solidFill>
@@ -5357,7 +5316,7 @@
               <a:tabLst/>
             </a:pPr>
             <a:r>
-              <a:rPr kumimoji="0" lang="en-US" altLang="en-US" sz="1100" b="0" i="0" u="none" strike="noStrike" cap="none" normalizeH="0" baseline="0" dirty="0" err="1" smtClean="0">
+              <a:rPr kumimoji="0" lang="en-US" altLang="en-US" sz="1100" b="0" i="0" u="none" strike="noStrike" cap="none" normalizeH="0" baseline="0" dirty="0" smtClean="0">
                 <a:ln>
                   <a:noFill/>
                 </a:ln>
@@ -5369,22 +5328,7 @@
                 <a:ea typeface="Calibri" panose="020F0502020204030204" pitchFamily="34" charset="0"/>
                 <a:cs typeface="Times New Roman" panose="02020603050405020304" pitchFamily="18" charset="0"/>
               </a:rPr>
-              <a:t>Neuralink</a:t>
-            </a:r>
-            <a:r>
-              <a:rPr kumimoji="0" lang="en-US" altLang="en-US" sz="1100" b="0" i="0" u="none" strike="noStrike" cap="none" normalizeH="0" baseline="0" dirty="0" smtClean="0">
-                <a:ln>
-                  <a:noFill/>
-                </a:ln>
-                <a:solidFill>
-                  <a:srgbClr val="FFFFFF"/>
-                </a:solidFill>
-                <a:effectLst/>
-                <a:latin typeface="Calibri" panose="020F0502020204030204" pitchFamily="34" charset="0"/>
-                <a:ea typeface="Calibri" panose="020F0502020204030204" pitchFamily="34" charset="0"/>
-                <a:cs typeface="Times New Roman" panose="02020603050405020304" pitchFamily="18" charset="0"/>
-              </a:rPr>
-              <a:t> hopes to use this technology to allow people to control devices like mobile phones and Bluetooth mice and keyboards, and eventually robotic limbs.</a:t>
+              <a:t>Neuralink hopes to use this technology to allow people to control devices like mobile phones and Bluetooth mice and keyboards, and eventually robotic limbs.</a:t>
             </a:r>
             <a:endParaRPr kumimoji="0" lang="en-US" altLang="en-US" sz="800" b="0" i="0" u="none" strike="noStrike" cap="none" normalizeH="0" baseline="0" dirty="0" smtClean="0">
               <a:ln>
@@ -5426,37 +5370,7 @@
                 <a:ea typeface="Calibri" panose="020F0502020204030204" pitchFamily="34" charset="0"/>
                 <a:cs typeface="Times New Roman" panose="02020603050405020304" pitchFamily="18" charset="0"/>
               </a:rPr>
-              <a:t>In addition, the diagram above shows how </a:t>
-            </a:r>
-            <a:r>
-              <a:rPr kumimoji="0" lang="en-US" altLang="en-US" sz="1100" b="0" i="0" u="none" strike="noStrike" cap="none" normalizeH="0" baseline="0" dirty="0" err="1" smtClean="0">
-                <a:ln>
-                  <a:noFill/>
-                </a:ln>
-                <a:solidFill>
-                  <a:srgbClr val="FFFFFF"/>
-                </a:solidFill>
-                <a:effectLst/>
-                <a:latin typeface="Calibri" panose="020F0502020204030204" pitchFamily="34" charset="0"/>
-                <a:ea typeface="Calibri" panose="020F0502020204030204" pitchFamily="34" charset="0"/>
-                <a:cs typeface="Times New Roman" panose="02020603050405020304" pitchFamily="18" charset="0"/>
-              </a:rPr>
-              <a:t>Neuralink</a:t>
-            </a:r>
-            <a:r>
-              <a:rPr kumimoji="0" lang="en-US" altLang="en-US" sz="1100" b="0" i="0" u="none" strike="noStrike" cap="none" normalizeH="0" baseline="0" dirty="0" smtClean="0">
-                <a:ln>
-                  <a:noFill/>
-                </a:ln>
-                <a:solidFill>
-                  <a:srgbClr val="FFFFFF"/>
-                </a:solidFill>
-                <a:effectLst/>
-                <a:latin typeface="Calibri" panose="020F0502020204030204" pitchFamily="34" charset="0"/>
-                <a:ea typeface="Calibri" panose="020F0502020204030204" pitchFamily="34" charset="0"/>
-                <a:cs typeface="Times New Roman" panose="02020603050405020304" pitchFamily="18" charset="0"/>
-              </a:rPr>
-              <a:t> can also provide users with haptic feedback to specific parts of the body, sending impulses to the brain that simulate what happens when a certain stimulus occurs [5].</a:t>
+              <a:t>In addition, the diagram above shows how Neuralink can also provide users with haptic feedback to specific parts of the body, sending impulses to the brain that simulate what happens when a certain stimulus occurs [5].</a:t>
             </a:r>
             <a:endParaRPr kumimoji="0" lang="en-US" altLang="en-US" sz="1800" b="0" i="0" u="none" strike="noStrike" cap="none" normalizeH="0" baseline="0" dirty="0" smtClean="0">
               <a:ln>
@@ -5578,7 +5492,7 @@
                   </a:spcAft>
                 </a:pPr>
                 <a:r>
-                  <a:rPr lang="en-US" sz="1100">
+                  <a:rPr lang="en-US" sz="1100" dirty="0">
                     <a:effectLst/>
                     <a:latin typeface="Calibri" panose="020F0502020204030204" pitchFamily="34" charset="0"/>
                     <a:ea typeface="Calibri" panose="020F0502020204030204" pitchFamily="34" charset="0"/>
@@ -5630,7 +5544,7 @@
                 </a:spcAft>
               </a:pPr>
               <a:r>
-                <a:rPr lang="en-US" sz="1100">
+                <a:rPr lang="en-US" sz="1100" dirty="0">
                   <a:solidFill>
                     <a:srgbClr val="FFFFFF"/>
                   </a:solidFill>
@@ -5641,7 +5555,7 @@
                 </a:rPr>
                 <a:t>[5]</a:t>
               </a:r>
-              <a:endParaRPr lang="en-US" sz="1100">
+              <a:endParaRPr lang="en-US" sz="1100" dirty="0">
                 <a:effectLst/>
                 <a:latin typeface="Calibri" panose="020F0502020204030204" pitchFamily="34" charset="0"/>
                 <a:ea typeface="Calibri" panose="020F0502020204030204" pitchFamily="34" charset="0"/>
@@ -5710,7 +5624,7 @@
           </a:bodyPr>
           <a:lstStyle/>
           <a:p>
-            <a:endParaRPr lang="en-US"/>
+            <a:endParaRPr lang="en-US" dirty="0"/>
           </a:p>
         </p:txBody>
       </p:sp>
@@ -5773,7 +5687,7 @@
           </a:bodyPr>
           <a:lstStyle/>
           <a:p>
-            <a:endParaRPr lang="en-US"/>
+            <a:endParaRPr lang="en-US" dirty="0"/>
           </a:p>
         </p:txBody>
       </p:sp>
@@ -5837,8 +5751,8 @@
         </p:blipFill>
         <p:spPr bwMode="auto">
           <a:xfrm>
-            <a:off x="-391186" y="0"/>
-            <a:ext cx="13116586" cy="6858000"/>
+            <a:off x="0" y="0"/>
+            <a:ext cx="12192000" cy="6858000"/>
           </a:xfrm>
           <a:prstGeom prst="rect">
             <a:avLst/>
@@ -6019,7 +5933,7 @@
         <p:spPr bwMode="auto">
           <a:xfrm>
             <a:off x="0" y="0"/>
-            <a:ext cx="12192000" cy="6926580"/>
+            <a:ext cx="12192000" cy="6858000"/>
           </a:xfrm>
           <a:prstGeom prst="rect">
             <a:avLst/>
@@ -6214,8 +6128,8 @@
         </p:blipFill>
         <p:spPr bwMode="auto">
           <a:xfrm>
-            <a:off x="0" y="-21602"/>
-            <a:ext cx="12230402" cy="6879601"/>
+            <a:off x="0" y="0"/>
+            <a:ext cx="12192000" cy="6858000"/>
           </a:xfrm>
           <a:prstGeom prst="rect">
             <a:avLst/>
@@ -6599,7 +6513,7 @@
           </p:cNvPicPr>
           <p:nvPr/>
         </p:nvPicPr>
-        <p:blipFill>
+        <p:blipFill rotWithShape="1">
           <a:blip r:embed="rId2">
             <a:extLst>
               <a:ext uri="{28A0092B-C50C-407E-A947-70E740481C1C}">
@@ -6607,15 +6521,13 @@
               </a:ext>
             </a:extLst>
           </a:blip>
-          <a:srcRect/>
-          <a:stretch>
-            <a:fillRect/>
-          </a:stretch>
+          <a:srcRect l="7246"/>
+          <a:stretch/>
         </p:blipFill>
         <p:spPr bwMode="auto">
           <a:xfrm>
-            <a:off x="-742950" y="-195628"/>
-            <a:ext cx="14107256" cy="7053628"/>
+            <a:off x="0" y="0"/>
+            <a:ext cx="12192000" cy="6858000"/>
           </a:xfrm>
           <a:prstGeom prst="rect">
             <a:avLst/>
@@ -6981,36 +6893,12 @@
               <a:buNone/>
             </a:pPr>
             <a:r>
-              <a:rPr lang="en-US" dirty="0" err="1">
-                <a:solidFill>
-                  <a:srgbClr val="FFFFFF"/>
-                </a:solidFill>
-              </a:rPr>
-              <a:t>Bocetta</a:t>
-            </a:r>
-            <a:r>
               <a:rPr lang="en-US" dirty="0">
                 <a:solidFill>
                   <a:srgbClr val="FFFFFF"/>
                 </a:solidFill>
               </a:rPr>
-              <a:t>, Sam. "What are the Security Implications of Elon Musk's </a:t>
-            </a:r>
-            <a:r>
-              <a:rPr lang="en-US" dirty="0" err="1">
-                <a:solidFill>
-                  <a:srgbClr val="FFFFFF"/>
-                </a:solidFill>
-              </a:rPr>
-              <a:t>Neuralink</a:t>
-            </a:r>
-            <a:r>
-              <a:rPr lang="en-US" dirty="0">
-                <a:solidFill>
-                  <a:srgbClr val="FFFFFF"/>
-                </a:solidFill>
-              </a:rPr>
-              <a:t>?" CSO, 1 Aug. 2019, https://</a:t>
+              <a:t>Bocetta, Sam. "What are the Security Implications of Elon Musk's Neuralink?" CSO, 1 Aug. 2019, https://</a:t>
             </a:r>
             <a:r>
               <a:rPr lang="en-US" dirty="0" smtClean="0">
@@ -7062,23 +6950,7 @@
                   <a:srgbClr val="FFFFFF"/>
                 </a:solidFill>
               </a:rPr>
-              <a:t>Hamilton, Isobel Asher. "We Spoke to 2 Neuroscientists About How Exciting Elon Musk's </a:t>
-            </a:r>
-            <a:r>
-              <a:rPr lang="en-US" dirty="0" err="1">
-                <a:solidFill>
-                  <a:srgbClr val="FFFFFF"/>
-                </a:solidFill>
-              </a:rPr>
-              <a:t>Neuralink</a:t>
-            </a:r>
-            <a:r>
-              <a:rPr lang="en-US" dirty="0">
-                <a:solidFill>
-                  <a:srgbClr val="FFFFFF"/>
-                </a:solidFill>
-              </a:rPr>
-              <a:t> Really Is." Business Insider, 6 Oct. 2019, https://</a:t>
+              <a:t>Hamilton, Isobel Asher. "We Spoke to 2 Neuroscientists About How Exciting Elon Musk's Neuralink Really Is." Business Insider, 6 Oct. 2019, https://</a:t>
             </a:r>
             <a:r>
               <a:rPr lang="en-US" dirty="0" smtClean="0">
@@ -7125,52 +6997,12 @@
               <a:buNone/>
             </a:pPr>
             <a:r>
-              <a:rPr lang="en-US" dirty="0" err="1">
-                <a:solidFill>
-                  <a:srgbClr val="FFFFFF"/>
-                </a:solidFill>
-              </a:rPr>
-              <a:t>Lopatto</a:t>
-            </a:r>
-            <a:r>
               <a:rPr lang="en-US" dirty="0">
                 <a:solidFill>
                   <a:srgbClr val="FFFFFF"/>
                 </a:solidFill>
               </a:rPr>
-              <a:t>, Elizabeth. "Elon Musk Unveils </a:t>
-            </a:r>
-            <a:r>
-              <a:rPr lang="en-US" dirty="0" err="1">
-                <a:solidFill>
-                  <a:srgbClr val="FFFFFF"/>
-                </a:solidFill>
-              </a:rPr>
-              <a:t>Neuralink’s</a:t>
-            </a:r>
-            <a:r>
-              <a:rPr lang="en-US" dirty="0">
-                <a:solidFill>
-                  <a:srgbClr val="FFFFFF"/>
-                </a:solidFill>
-              </a:rPr>
-              <a:t> Plans For Brain-reading ‘Threads’ and a Robot to Insert Them." </a:t>
-            </a:r>
-            <a:r>
-              <a:rPr lang="en-US" dirty="0" err="1">
-                <a:solidFill>
-                  <a:srgbClr val="FFFFFF"/>
-                </a:solidFill>
-              </a:rPr>
-              <a:t>TheVerge</a:t>
-            </a:r>
-            <a:r>
-              <a:rPr lang="en-US" dirty="0">
-                <a:solidFill>
-                  <a:srgbClr val="FFFFFF"/>
-                </a:solidFill>
-              </a:rPr>
-              <a:t>, 16 Jul. 2019, https://</a:t>
+              <a:t>Lopatto, Elizabeth. "Elon Musk Unveils Neuralink’s Plans For Brain-reading ‘Threads’ and a Robot to Insert Them." TheVerge, 16 Jul. 2019, https://</a:t>
             </a:r>
             <a:r>
               <a:rPr lang="en-US" dirty="0" smtClean="0">
@@ -7217,52 +7049,12 @@
               <a:buNone/>
             </a:pPr>
             <a:r>
-              <a:rPr lang="en-US" dirty="0" err="1">
-                <a:solidFill>
-                  <a:srgbClr val="FFFFFF"/>
-                </a:solidFill>
-              </a:rPr>
-              <a:t>Markman</a:t>
-            </a:r>
-            <a:r>
               <a:rPr lang="en-US" dirty="0">
                 <a:solidFill>
                   <a:srgbClr val="FFFFFF"/>
                 </a:solidFill>
               </a:rPr>
-              <a:t>, Jon. "Elon Musk's </a:t>
-            </a:r>
-            <a:r>
-              <a:rPr lang="en-US" dirty="0" err="1">
-                <a:solidFill>
-                  <a:srgbClr val="FFFFFF"/>
-                </a:solidFill>
-              </a:rPr>
-              <a:t>Neuralink</a:t>
-            </a:r>
-            <a:r>
-              <a:rPr lang="en-US" dirty="0">
-                <a:solidFill>
-                  <a:srgbClr val="FFFFFF"/>
-                </a:solidFill>
-              </a:rPr>
-              <a:t> is </a:t>
-            </a:r>
-            <a:r>
-              <a:rPr lang="en-US" dirty="0" err="1">
-                <a:solidFill>
-                  <a:srgbClr val="FFFFFF"/>
-                </a:solidFill>
-              </a:rPr>
-              <a:t>Sci-FI</a:t>
-            </a:r>
-            <a:r>
-              <a:rPr lang="en-US" dirty="0">
-                <a:solidFill>
-                  <a:srgbClr val="FFFFFF"/>
-                </a:solidFill>
-              </a:rPr>
-              <a:t> Made Real." Forbes, 30 Aug. 2019, https://www.forbes.com/sites/jonmarkman/2019/08/30/elon-musks-neuralink-is-sci-fi-made-real/#</a:t>
+              <a:t>Markman, Jon. "Elon Musk's Neuralink is Sci-FI Made Real." Forbes, 30 Aug. 2019, https://www.forbes.com/sites/jonmarkman/2019/08/30/elon-musks-neuralink-is-sci-fi-made-real/#</a:t>
             </a:r>
             <a:r>
               <a:rPr lang="en-US" dirty="0" smtClean="0">
@@ -7296,100 +7088,12 @@
               <a:buNone/>
             </a:pPr>
             <a:r>
-              <a:rPr lang="en-US" dirty="0" err="1">
-                <a:solidFill>
-                  <a:srgbClr val="FFFFFF"/>
-                </a:solidFill>
-              </a:rPr>
-              <a:t>Neuralink</a:t>
-            </a:r>
-            <a:r>
               <a:rPr lang="en-US" dirty="0">
                 <a:solidFill>
                   <a:srgbClr val="FFFFFF"/>
                 </a:solidFill>
               </a:rPr>
-              <a:t>. “</a:t>
-            </a:r>
-            <a:r>
-              <a:rPr lang="en-US" dirty="0" err="1">
-                <a:solidFill>
-                  <a:srgbClr val="FFFFFF"/>
-                </a:solidFill>
-              </a:rPr>
-              <a:t>Neurolink</a:t>
-            </a:r>
-            <a:r>
-              <a:rPr lang="en-US" dirty="0">
-                <a:solidFill>
-                  <a:srgbClr val="FFFFFF"/>
-                </a:solidFill>
-              </a:rPr>
-              <a:t> Launch Event” YouTube, commentary by Elon Musk, Max </a:t>
-            </a:r>
-            <a:r>
-              <a:rPr lang="en-US" dirty="0" err="1">
-                <a:solidFill>
-                  <a:srgbClr val="FFFFFF"/>
-                </a:solidFill>
-              </a:rPr>
-              <a:t>Hodak</a:t>
-            </a:r>
-            <a:r>
-              <a:rPr lang="en-US" dirty="0">
-                <a:solidFill>
-                  <a:srgbClr val="FFFFFF"/>
-                </a:solidFill>
-              </a:rPr>
-              <a:t>, Matthew MacDougall, Vanessa </a:t>
-            </a:r>
-            <a:r>
-              <a:rPr lang="en-US" dirty="0" err="1">
-                <a:solidFill>
-                  <a:srgbClr val="FFFFFF"/>
-                </a:solidFill>
-              </a:rPr>
-              <a:t>Tolosa</a:t>
-            </a:r>
-            <a:r>
-              <a:rPr lang="en-US" dirty="0">
-                <a:solidFill>
-                  <a:srgbClr val="FFFFFF"/>
-                </a:solidFill>
-              </a:rPr>
-              <a:t>, DJ </a:t>
-            </a:r>
-            <a:r>
-              <a:rPr lang="en-US" dirty="0" err="1">
-                <a:solidFill>
-                  <a:srgbClr val="FFFFFF"/>
-                </a:solidFill>
-              </a:rPr>
-              <a:t>Seo</a:t>
-            </a:r>
-            <a:r>
-              <a:rPr lang="en-US" dirty="0">
-                <a:solidFill>
-                  <a:srgbClr val="FFFFFF"/>
-                </a:solidFill>
-              </a:rPr>
-              <a:t>, and Philip </a:t>
-            </a:r>
-            <a:r>
-              <a:rPr lang="en-US" dirty="0" err="1">
-                <a:solidFill>
-                  <a:srgbClr val="FFFFFF"/>
-                </a:solidFill>
-              </a:rPr>
-              <a:t>Sabes</a:t>
-            </a:r>
-            <a:r>
-              <a:rPr lang="en-US" dirty="0">
-                <a:solidFill>
-                  <a:srgbClr val="FFFFFF"/>
-                </a:solidFill>
-              </a:rPr>
-              <a:t>, 16 Jul. 2019, https://www.youtube.com/watch?v=r-vbh3t7WVI&amp;feature=youtu.be</a:t>
+              <a:t>Neuralink. “Neurolink Launch Event” YouTube, commentary by Elon Musk, Max Hodak, Matthew MacDougall, Vanessa Tolosa, DJ Seo, and Philip Sabes, 16 Jul. 2019, https://www.youtube.com/watch?v=r-vbh3t7WVI&amp;feature=youtu.be</a:t>
             </a:r>
             <a:r>
               <a:rPr lang="en-US" dirty="0" smtClean="0">
@@ -7428,23 +7132,7 @@
                   <a:srgbClr val="FFFFFF"/>
                 </a:solidFill>
               </a:rPr>
-              <a:t>Scammell, Robert. "</a:t>
-            </a:r>
-            <a:r>
-              <a:rPr lang="en-US" dirty="0" err="1">
-                <a:solidFill>
-                  <a:srgbClr val="FFFFFF"/>
-                </a:solidFill>
-              </a:rPr>
-              <a:t>Neuralink</a:t>
-            </a:r>
-            <a:r>
-              <a:rPr lang="en-US" dirty="0">
-                <a:solidFill>
-                  <a:srgbClr val="FFFFFF"/>
-                </a:solidFill>
-              </a:rPr>
-              <a:t> Security "Has to be Solid" to Avoid Brain Hacking." Verdict, 24 Jul. 2019, https://</a:t>
+              <a:t>Scammell, Robert. "Neuralink Security "Has to be Solid" to Avoid Brain Hacking." Verdict, 24 Jul. 2019, https://</a:t>
             </a:r>
             <a:r>
               <a:rPr lang="en-US" dirty="0" smtClean="0">
@@ -7483,23 +7171,7 @@
                   <a:srgbClr val="FFFFFF"/>
                 </a:solidFill>
               </a:rPr>
-              <a:t>Stewart, Ryan. "Latest Bluetooth Hacking Techniques Expose New Attack Vectors For Hackers." </a:t>
-            </a:r>
-            <a:r>
-              <a:rPr lang="en-US" dirty="0" err="1">
-                <a:solidFill>
-                  <a:srgbClr val="FFFFFF"/>
-                </a:solidFill>
-              </a:rPr>
-              <a:t>Cyware</a:t>
-            </a:r>
-            <a:r>
-              <a:rPr lang="en-US" dirty="0">
-                <a:solidFill>
-                  <a:srgbClr val="FFFFFF"/>
-                </a:solidFill>
-              </a:rPr>
-              <a:t>, 6 Jan. 2019, https://cyware.com/news/latest-bluetooth-hacking-techniques-expose-new-attack-vectors-for-hackers-a16cfb5e</a:t>
+              <a:t>Stewart, Ryan. "Latest Bluetooth Hacking Techniques Expose New Attack Vectors For Hackers." Cyware, 6 Jan. 2019, https://cyware.com/news/latest-bluetooth-hacking-techniques-expose-new-attack-vectors-for-hackers-a16cfb5e</a:t>
             </a:r>
           </a:p>
         </p:txBody>
@@ -7527,12 +7199,12 @@
 <file path=ppt/theme/theme1.xml><?xml version="1.0" encoding="utf-8"?>
 <a:theme xmlns:a="http://schemas.openxmlformats.org/drawingml/2006/main" name="Headlines">
   <a:themeElements>
-    <a:clrScheme name="Custom 4">
+    <a:clrScheme name="Custom 6">
       <a:dk1>
-        <a:srgbClr val="000000"/>
+        <a:srgbClr val="439EB7"/>
       </a:dk1>
       <a:lt1>
-        <a:srgbClr val="000000"/>
+        <a:srgbClr val="439EB7"/>
       </a:lt1>
       <a:dk2>
         <a:srgbClr val="000000"/>
@@ -7544,25 +7216,25 @@
         <a:srgbClr val="439EB7"/>
       </a:accent1>
       <a:accent2>
-        <a:srgbClr val="E28B55"/>
+        <a:srgbClr val="439EB7"/>
       </a:accent2>
       <a:accent3>
-        <a:srgbClr val="DCB64D"/>
+        <a:srgbClr val="439EB7"/>
       </a:accent3>
       <a:accent4>
-        <a:srgbClr val="4CA198"/>
+        <a:srgbClr val="439EB7"/>
       </a:accent4>
       <a:accent5>
-        <a:srgbClr val="835B82"/>
+        <a:srgbClr val="439EB7"/>
       </a:accent5>
       <a:accent6>
-        <a:srgbClr val="645135"/>
+        <a:srgbClr val="439EB7"/>
       </a:accent6>
       <a:hlink>
         <a:srgbClr val="439EB7"/>
       </a:hlink>
       <a:folHlink>
-        <a:srgbClr val="835B82"/>
+        <a:srgbClr val="439EB7"/>
       </a:folHlink>
     </a:clrScheme>
     <a:fontScheme name="Headlines">

</xml_diff>